<commit_message>
add my picture in ppt
</commit_message>
<xml_diff>
--- a/Documentation/Slide deck intro.pptx
+++ b/Documentation/Slide deck intro.pptx
@@ -3924,7 +3924,7 @@
       </p:grpSpPr>
       <p:sp>
         <p:nvSpPr>
-          <p:cNvPr id="9" name="Rectangle 8">
+          <p:cNvPr id="20" name="Rectangle 19">
             <a:extLst>
               <a:ext uri="{FF2B5EF4-FFF2-40B4-BE49-F238E27FC236}">
                 <a16:creationId xmlns:a16="http://schemas.microsoft.com/office/drawing/2014/main" id="{158B3569-73B2-4D05-8E95-886A6EE17F1F}"/>
@@ -3990,114 +3990,158 @@
           <a:lstStyle/>
           <a:p>
             <a:pPr algn="ctr"/>
-            <a:endParaRPr lang="en-US"/>
-          </a:p>
-        </p:txBody>
-      </p:sp>
-      <p:sp>
-        <p:nvSpPr>
-          <p:cNvPr id="3" name="Subtitle 2">
-            <a:extLst>
-              <a:ext uri="{FF2B5EF4-FFF2-40B4-BE49-F238E27FC236}">
-                <a16:creationId xmlns:a16="http://schemas.microsoft.com/office/drawing/2014/main" id="{49409889-E725-4191-9162-4F067215B798}"/>
-              </a:ext>
-            </a:extLst>
-          </p:cNvPr>
-          <p:cNvSpPr>
-            <a:spLocks noGrp="1"/>
-          </p:cNvSpPr>
-          <p:nvPr>
-            <p:ph type="subTitle" idx="1"/>
-          </p:nvPr>
+            <a:endParaRPr lang="en-US" sz="1600"/>
+          </a:p>
+        </p:txBody>
+      </p:sp>
+      <p:sp>
+        <p:nvSpPr>
+          <p:cNvPr id="12" name="TextBox 11">
+            <a:extLst>
+              <a:ext uri="{FF2B5EF4-FFF2-40B4-BE49-F238E27FC236}">
+                <a16:creationId xmlns:a16="http://schemas.microsoft.com/office/drawing/2014/main" id="{BF79881C-8EAE-4241-940E-F5275C8EFE3D}"/>
+              </a:ext>
+            </a:extLst>
+          </p:cNvPr>
+          <p:cNvSpPr txBox="1"/>
+          <p:nvPr/>
         </p:nvSpPr>
         <p:spPr>
           <a:xfrm>
-            <a:off x="793159" y="5170453"/>
-            <a:ext cx="4076458" cy="990197"/>
-          </a:xfrm>
-        </p:spPr>
-        <p:txBody>
-          <a:bodyPr>
-            <a:normAutofit/>
-          </a:bodyPr>
-          <a:lstStyle/>
-          <a:p>
-            <a:pPr algn="r"/>
-            <a:r>
-              <a:rPr lang="en-CA" dirty="0">
-                <a:solidFill>
-                  <a:schemeClr val="bg1"/>
-                </a:solidFill>
-              </a:rPr>
-              <a:t>Course Code: GAME2005</a:t>
-            </a:r>
-          </a:p>
-          <a:p>
-            <a:pPr algn="r"/>
-            <a:r>
-              <a:rPr lang="en-CA" dirty="0">
-                <a:solidFill>
-                  <a:schemeClr val="bg1"/>
-                </a:solidFill>
-              </a:rPr>
-              <a:t>Course Name: Game Physics</a:t>
-            </a:r>
-          </a:p>
-        </p:txBody>
-      </p:sp>
-      <p:pic>
-        <p:nvPicPr>
-          <p:cNvPr id="4" name="Picture 3">
-            <a:extLst>
-              <a:ext uri="{FF2B5EF4-FFF2-40B4-BE49-F238E27FC236}">
-                <a16:creationId xmlns:a16="http://schemas.microsoft.com/office/drawing/2014/main" id="{23CF2BEF-42E6-4433-B416-5BC61D2968AB}"/>
-              </a:ext>
-            </a:extLst>
-          </p:cNvPr>
-          <p:cNvPicPr>
-            <a:picLocks noChangeAspect="1"/>
-          </p:cNvPicPr>
-          <p:nvPr/>
-        </p:nvPicPr>
-        <p:blipFill rotWithShape="1">
-          <a:blip r:embed="rId2">
-            <a:duotone>
-              <a:schemeClr val="accent2">
-                <a:shade val="45000"/>
-                <a:satMod val="135000"/>
-              </a:schemeClr>
-              <a:prstClr val="white"/>
-            </a:duotone>
-            <a:alphaModFix amt="51000"/>
-          </a:blip>
-          <a:srcRect l="34693"/>
-          <a:stretch/>
-        </p:blipFill>
-        <p:spPr>
-          <a:xfrm>
-            <a:off x="5457027" y="10"/>
-            <a:ext cx="6734973" cy="6857990"/>
+            <a:off x="457200" y="1598246"/>
+            <a:ext cx="4412419" cy="3626217"/>
           </a:xfrm>
           <a:prstGeom prst="rect">
             <a:avLst/>
           </a:prstGeom>
         </p:spPr>
-      </p:pic>
-      <p:sp>
-        <p:nvSpPr>
-          <p:cNvPr id="11" name="Graphic 17">
-            <a:extLst>
-              <a:ext uri="{FF2B5EF4-FFF2-40B4-BE49-F238E27FC236}">
-                <a16:creationId xmlns:a16="http://schemas.microsoft.com/office/drawing/2014/main" id="{B71758F4-3F46-45DA-8AC5-4E508DA080BA}"/>
+        <p:txBody>
+          <a:bodyPr vert="horz" lIns="91440" tIns="45720" rIns="91440" bIns="45720" rtlCol="0" anchor="t">
+            <a:normAutofit/>
+          </a:bodyPr>
+          <a:lstStyle/>
+          <a:p>
+            <a:pPr algn="r">
+              <a:lnSpc>
+                <a:spcPct val="90000"/>
+              </a:lnSpc>
+              <a:spcBef>
+                <a:spcPct val="0"/>
+              </a:spcBef>
+              <a:spcAft>
+                <a:spcPts val="600"/>
+              </a:spcAft>
+            </a:pPr>
+            <a:r>
+              <a:rPr lang="en-US" sz="3800" b="1" i="0" kern="1200" cap="all" baseline="0">
+                <a:solidFill>
+                  <a:schemeClr val="bg1"/>
+                </a:solidFill>
+                <a:latin typeface="+mj-lt"/>
+                <a:ea typeface="+mj-ea"/>
+                <a:cs typeface="+mj-cs"/>
+              </a:rPr>
+              <a:t>Assignment 1:</a:t>
+            </a:r>
+          </a:p>
+          <a:p>
+            <a:pPr algn="r">
+              <a:lnSpc>
+                <a:spcPct val="90000"/>
+              </a:lnSpc>
+              <a:spcBef>
+                <a:spcPct val="0"/>
+              </a:spcBef>
+              <a:spcAft>
+                <a:spcPts val="600"/>
+              </a:spcAft>
+            </a:pPr>
+            <a:r>
+              <a:rPr lang="en-US" sz="3800" b="1" i="0" kern="1200" cap="all" baseline="0">
+                <a:solidFill>
+                  <a:schemeClr val="bg1"/>
+                </a:solidFill>
+                <a:latin typeface="+mj-lt"/>
+                <a:ea typeface="+mj-ea"/>
+                <a:cs typeface="+mj-cs"/>
+              </a:rPr>
+              <a:t>Motion in One and Two Directions</a:t>
+            </a:r>
+          </a:p>
+        </p:txBody>
+      </p:sp>
+      <p:sp>
+        <p:nvSpPr>
+          <p:cNvPr id="3" name="Subtitle 2">
+            <a:extLst>
+              <a:ext uri="{FF2B5EF4-FFF2-40B4-BE49-F238E27FC236}">
+                <a16:creationId xmlns:a16="http://schemas.microsoft.com/office/drawing/2014/main" id="{49409889-E725-4191-9162-4F067215B798}"/>
+              </a:ext>
+            </a:extLst>
+          </p:cNvPr>
+          <p:cNvSpPr>
+            <a:spLocks noGrp="1"/>
+          </p:cNvSpPr>
+          <p:nvPr>
+            <p:ph type="subTitle" idx="1"/>
+          </p:nvPr>
+        </p:nvSpPr>
+        <p:spPr>
+          <a:xfrm>
+            <a:off x="457200" y="5350213"/>
+            <a:ext cx="4412417" cy="1031537"/>
+          </a:xfrm>
+        </p:spPr>
+        <p:txBody>
+          <a:bodyPr vert="horz" lIns="91440" tIns="45720" rIns="91440" bIns="45720" rtlCol="0">
+            <a:normAutofit/>
+          </a:bodyPr>
+          <a:lstStyle/>
+          <a:p>
+            <a:pPr algn="r"/>
+            <a:r>
+              <a:rPr lang="en-US" sz="2700" kern="1200">
+                <a:solidFill>
+                  <a:schemeClr val="bg1"/>
+                </a:solidFill>
+                <a:latin typeface="+mn-lt"/>
+                <a:ea typeface="+mn-ea"/>
+                <a:cs typeface="+mn-cs"/>
+              </a:rPr>
+              <a:t>Course Code: GAME2005</a:t>
+            </a:r>
+          </a:p>
+          <a:p>
+            <a:pPr algn="r"/>
+            <a:r>
+              <a:rPr lang="en-US" sz="2700" kern="1200">
+                <a:solidFill>
+                  <a:schemeClr val="bg1"/>
+                </a:solidFill>
+                <a:latin typeface="+mn-lt"/>
+                <a:ea typeface="+mn-ea"/>
+                <a:cs typeface="+mn-cs"/>
+              </a:rPr>
+              <a:t>Course Name: Game Physics</a:t>
+            </a:r>
+          </a:p>
+        </p:txBody>
+      </p:sp>
+      <p:cxnSp>
+        <p:nvCxnSpPr>
+          <p:cNvPr id="22" name="Straight Connector 21">
+            <a:extLst>
+              <a:ext uri="{FF2B5EF4-FFF2-40B4-BE49-F238E27FC236}">
+                <a16:creationId xmlns:a16="http://schemas.microsoft.com/office/drawing/2014/main" id="{56020367-4FD5-4596-8E10-C5F095CD8DBF}"/>
               </a:ext>
               <a:ext uri="{C183D7F6-B498-43B3-948B-1728B52AA6E4}">
                 <adec:decorative xmlns:adec="http://schemas.microsoft.com/office/drawing/2017/decorative" val="1"/>
               </a:ext>
             </a:extLst>
           </p:cNvPr>
-          <p:cNvSpPr>
-            <a:spLocks noGrp="1" noRot="1" noChangeAspect="1" noMove="1" noResize="1" noEditPoints="1" noAdjustHandles="1" noChangeArrowheads="1" noChangeShapeType="1" noTextEdit="1"/>
-          </p:cNvSpPr>
+          <p:cNvCxnSpPr>
+            <a:cxnSpLocks noGrp="1" noRot="1" noChangeAspect="1" noMove="1" noResize="1" noEditPoints="1" noAdjustHandles="1" noChangeArrowheads="1" noChangeShapeType="1"/>
+          </p:cNvCxnSpPr>
           <p:nvPr>
             <p:extLst>
               <p:ext uri="{386F3935-93C4-4BCD-93E2-E3B085C9AB24}">
@@ -4105,329 +4149,11 @@
               </p:ext>
             </p:extLst>
           </p:nvPr>
-        </p:nvSpPr>
+        </p:nvCxnSpPr>
         <p:spPr>
           <a:xfrm>
-            <a:off x="10957736" y="815001"/>
-            <a:ext cx="139039" cy="139039"/>
-          </a:xfrm>
-          <a:custGeom>
-            <a:avLst/>
-            <a:gdLst>
-              <a:gd name="connsiteX0" fmla="*/ 129602 w 139039"/>
-              <a:gd name="connsiteY0" fmla="*/ 60082 h 139039"/>
-              <a:gd name="connsiteX1" fmla="*/ 78957 w 139039"/>
-              <a:gd name="connsiteY1" fmla="*/ 60082 h 139039"/>
-              <a:gd name="connsiteX2" fmla="*/ 78957 w 139039"/>
-              <a:gd name="connsiteY2" fmla="*/ 9437 h 139039"/>
-              <a:gd name="connsiteX3" fmla="*/ 69520 w 139039"/>
-              <a:gd name="connsiteY3" fmla="*/ 0 h 139039"/>
-              <a:gd name="connsiteX4" fmla="*/ 60082 w 139039"/>
-              <a:gd name="connsiteY4" fmla="*/ 9437 h 139039"/>
-              <a:gd name="connsiteX5" fmla="*/ 60082 w 139039"/>
-              <a:gd name="connsiteY5" fmla="*/ 60082 h 139039"/>
-              <a:gd name="connsiteX6" fmla="*/ 9437 w 139039"/>
-              <a:gd name="connsiteY6" fmla="*/ 60082 h 139039"/>
-              <a:gd name="connsiteX7" fmla="*/ 0 w 139039"/>
-              <a:gd name="connsiteY7" fmla="*/ 69520 h 139039"/>
-              <a:gd name="connsiteX8" fmla="*/ 9437 w 139039"/>
-              <a:gd name="connsiteY8" fmla="*/ 78957 h 139039"/>
-              <a:gd name="connsiteX9" fmla="*/ 60082 w 139039"/>
-              <a:gd name="connsiteY9" fmla="*/ 78957 h 139039"/>
-              <a:gd name="connsiteX10" fmla="*/ 60082 w 139039"/>
-              <a:gd name="connsiteY10" fmla="*/ 129602 h 139039"/>
-              <a:gd name="connsiteX11" fmla="*/ 69520 w 139039"/>
-              <a:gd name="connsiteY11" fmla="*/ 139039 h 139039"/>
-              <a:gd name="connsiteX12" fmla="*/ 78957 w 139039"/>
-              <a:gd name="connsiteY12" fmla="*/ 129602 h 139039"/>
-              <a:gd name="connsiteX13" fmla="*/ 78957 w 139039"/>
-              <a:gd name="connsiteY13" fmla="*/ 78957 h 139039"/>
-              <a:gd name="connsiteX14" fmla="*/ 129602 w 139039"/>
-              <a:gd name="connsiteY14" fmla="*/ 78957 h 139039"/>
-              <a:gd name="connsiteX15" fmla="*/ 139039 w 139039"/>
-              <a:gd name="connsiteY15" fmla="*/ 69520 h 139039"/>
-              <a:gd name="connsiteX16" fmla="*/ 129602 w 139039"/>
-              <a:gd name="connsiteY16" fmla="*/ 60082 h 139039"/>
-            </a:gdLst>
-            <a:ahLst/>
-            <a:cxnLst>
-              <a:cxn ang="0">
-                <a:pos x="connsiteX0" y="connsiteY0"/>
-              </a:cxn>
-              <a:cxn ang="0">
-                <a:pos x="connsiteX1" y="connsiteY1"/>
-              </a:cxn>
-              <a:cxn ang="0">
-                <a:pos x="connsiteX2" y="connsiteY2"/>
-              </a:cxn>
-              <a:cxn ang="0">
-                <a:pos x="connsiteX3" y="connsiteY3"/>
-              </a:cxn>
-              <a:cxn ang="0">
-                <a:pos x="connsiteX4" y="connsiteY4"/>
-              </a:cxn>
-              <a:cxn ang="0">
-                <a:pos x="connsiteX5" y="connsiteY5"/>
-              </a:cxn>
-              <a:cxn ang="0">
-                <a:pos x="connsiteX6" y="connsiteY6"/>
-              </a:cxn>
-              <a:cxn ang="0">
-                <a:pos x="connsiteX7" y="connsiteY7"/>
-              </a:cxn>
-              <a:cxn ang="0">
-                <a:pos x="connsiteX8" y="connsiteY8"/>
-              </a:cxn>
-              <a:cxn ang="0">
-                <a:pos x="connsiteX9" y="connsiteY9"/>
-              </a:cxn>
-              <a:cxn ang="0">
-                <a:pos x="connsiteX10" y="connsiteY10"/>
-              </a:cxn>
-              <a:cxn ang="0">
-                <a:pos x="connsiteX11" y="connsiteY11"/>
-              </a:cxn>
-              <a:cxn ang="0">
-                <a:pos x="connsiteX12" y="connsiteY12"/>
-              </a:cxn>
-              <a:cxn ang="0">
-                <a:pos x="connsiteX13" y="connsiteY13"/>
-              </a:cxn>
-              <a:cxn ang="0">
-                <a:pos x="connsiteX14" y="connsiteY14"/>
-              </a:cxn>
-              <a:cxn ang="0">
-                <a:pos x="connsiteX15" y="connsiteY15"/>
-              </a:cxn>
-              <a:cxn ang="0">
-                <a:pos x="connsiteX16" y="connsiteY16"/>
-              </a:cxn>
-            </a:cxnLst>
-            <a:rect l="l" t="t" r="r" b="b"/>
-            <a:pathLst>
-              <a:path w="139039" h="139039">
-                <a:moveTo>
-                  <a:pt x="129602" y="60082"/>
-                </a:moveTo>
-                <a:lnTo>
-                  <a:pt x="78957" y="60082"/>
-                </a:lnTo>
-                <a:lnTo>
-                  <a:pt x="78957" y="9437"/>
-                </a:lnTo>
-                <a:cubicBezTo>
-                  <a:pt x="78957" y="4225"/>
-                  <a:pt x="74731" y="0"/>
-                  <a:pt x="69520" y="0"/>
-                </a:cubicBezTo>
-                <a:cubicBezTo>
-                  <a:pt x="64308" y="0"/>
-                  <a:pt x="60082" y="4225"/>
-                  <a:pt x="60082" y="9437"/>
-                </a:cubicBezTo>
-                <a:lnTo>
-                  <a:pt x="60082" y="60082"/>
-                </a:lnTo>
-                <a:lnTo>
-                  <a:pt x="9437" y="60082"/>
-                </a:lnTo>
-                <a:cubicBezTo>
-                  <a:pt x="4225" y="60082"/>
-                  <a:pt x="0" y="64308"/>
-                  <a:pt x="0" y="69520"/>
-                </a:cubicBezTo>
-                <a:cubicBezTo>
-                  <a:pt x="0" y="74731"/>
-                  <a:pt x="4225" y="78957"/>
-                  <a:pt x="9437" y="78957"/>
-                </a:cubicBezTo>
-                <a:lnTo>
-                  <a:pt x="60082" y="78957"/>
-                </a:lnTo>
-                <a:lnTo>
-                  <a:pt x="60082" y="129602"/>
-                </a:lnTo>
-                <a:cubicBezTo>
-                  <a:pt x="60082" y="134814"/>
-                  <a:pt x="64308" y="139039"/>
-                  <a:pt x="69520" y="139039"/>
-                </a:cubicBezTo>
-                <a:cubicBezTo>
-                  <a:pt x="74731" y="139039"/>
-                  <a:pt x="78957" y="134814"/>
-                  <a:pt x="78957" y="129602"/>
-                </a:cubicBezTo>
-                <a:lnTo>
-                  <a:pt x="78957" y="78957"/>
-                </a:lnTo>
-                <a:lnTo>
-                  <a:pt x="129602" y="78957"/>
-                </a:lnTo>
-                <a:cubicBezTo>
-                  <a:pt x="134814" y="78957"/>
-                  <a:pt x="139039" y="74731"/>
-                  <a:pt x="139039" y="69520"/>
-                </a:cubicBezTo>
-                <a:cubicBezTo>
-                  <a:pt x="139039" y="64308"/>
-                  <a:pt x="134814" y="60082"/>
-                  <a:pt x="129602" y="60082"/>
-                </a:cubicBezTo>
-                <a:close/>
-              </a:path>
-            </a:pathLst>
-          </a:custGeom>
-          <a:solidFill>
-            <a:schemeClr val="bg1"/>
-          </a:solidFill>
-          <a:ln w="603" cap="flat">
-            <a:noFill/>
-            <a:prstDash val="solid"/>
-            <a:miter/>
-          </a:ln>
-        </p:spPr>
-        <p:txBody>
-          <a:bodyPr rtlCol="0" anchor="ctr"/>
-          <a:lstStyle/>
-          <a:p>
-            <a:endParaRPr lang="en-US"/>
-          </a:p>
-        </p:txBody>
-      </p:sp>
-      <p:sp>
-        <p:nvSpPr>
-          <p:cNvPr id="13" name="Graphic 15">
-            <a:extLst>
-              <a:ext uri="{FF2B5EF4-FFF2-40B4-BE49-F238E27FC236}">
-                <a16:creationId xmlns:a16="http://schemas.microsoft.com/office/drawing/2014/main" id="{8550FED7-7C32-42BB-98DB-30272A6331A9}"/>
-              </a:ext>
-              <a:ext uri="{C183D7F6-B498-43B3-948B-1728B52AA6E4}">
-                <adec:decorative xmlns:adec="http://schemas.microsoft.com/office/drawing/2017/decorative" val="1"/>
-              </a:ext>
-            </a:extLst>
-          </p:cNvPr>
-          <p:cNvSpPr>
-            <a:spLocks noGrp="1" noRot="1" noChangeAspect="1" noMove="1" noResize="1" noEditPoints="1" noAdjustHandles="1" noChangeArrowheads="1" noChangeShapeType="1" noTextEdit="1"/>
-          </p:cNvSpPr>
-          <p:nvPr>
-            <p:extLst>
-              <p:ext uri="{386F3935-93C4-4BCD-93E2-E3B085C9AB24}">
-                <p16:designElem xmlns:p16="http://schemas.microsoft.com/office/powerpoint/2015/main" val="1"/>
-              </p:ext>
-            </p:extLst>
-          </p:nvPr>
-        </p:nvSpPr>
-        <p:spPr>
-          <a:xfrm>
-            <a:off x="11316516" y="1044297"/>
-            <a:ext cx="91138" cy="91138"/>
-          </a:xfrm>
-          <a:custGeom>
-            <a:avLst/>
-            <a:gdLst>
-              <a:gd name="connsiteX0" fmla="*/ 91138 w 91138"/>
-              <a:gd name="connsiteY0" fmla="*/ 45569 h 91138"/>
-              <a:gd name="connsiteX1" fmla="*/ 45569 w 91138"/>
-              <a:gd name="connsiteY1" fmla="*/ 91138 h 91138"/>
-              <a:gd name="connsiteX2" fmla="*/ 0 w 91138"/>
-              <a:gd name="connsiteY2" fmla="*/ 45569 h 91138"/>
-              <a:gd name="connsiteX3" fmla="*/ 45569 w 91138"/>
-              <a:gd name="connsiteY3" fmla="*/ 0 h 91138"/>
-              <a:gd name="connsiteX4" fmla="*/ 91138 w 91138"/>
-              <a:gd name="connsiteY4" fmla="*/ 45569 h 91138"/>
-            </a:gdLst>
-            <a:ahLst/>
-            <a:cxnLst>
-              <a:cxn ang="0">
-                <a:pos x="connsiteX0" y="connsiteY0"/>
-              </a:cxn>
-              <a:cxn ang="0">
-                <a:pos x="connsiteX1" y="connsiteY1"/>
-              </a:cxn>
-              <a:cxn ang="0">
-                <a:pos x="connsiteX2" y="connsiteY2"/>
-              </a:cxn>
-              <a:cxn ang="0">
-                <a:pos x="connsiteX3" y="connsiteY3"/>
-              </a:cxn>
-              <a:cxn ang="0">
-                <a:pos x="connsiteX4" y="connsiteY4"/>
-              </a:cxn>
-            </a:cxnLst>
-            <a:rect l="l" t="t" r="r" b="b"/>
-            <a:pathLst>
-              <a:path w="91138" h="91138">
-                <a:moveTo>
-                  <a:pt x="91138" y="45569"/>
-                </a:moveTo>
-                <a:cubicBezTo>
-                  <a:pt x="91138" y="70736"/>
-                  <a:pt x="70736" y="91138"/>
-                  <a:pt x="45569" y="91138"/>
-                </a:cubicBezTo>
-                <a:cubicBezTo>
-                  <a:pt x="20402" y="91138"/>
-                  <a:pt x="0" y="70736"/>
-                  <a:pt x="0" y="45569"/>
-                </a:cubicBezTo>
-                <a:cubicBezTo>
-                  <a:pt x="0" y="20402"/>
-                  <a:pt x="20402" y="0"/>
-                  <a:pt x="45569" y="0"/>
-                </a:cubicBezTo>
-                <a:cubicBezTo>
-                  <a:pt x="70736" y="0"/>
-                  <a:pt x="91138" y="20402"/>
-                  <a:pt x="91138" y="45569"/>
-                </a:cubicBezTo>
-                <a:close/>
-              </a:path>
-            </a:pathLst>
-          </a:custGeom>
-          <a:solidFill>
-            <a:schemeClr val="bg1"/>
-          </a:solidFill>
-          <a:ln w="422" cap="flat">
-            <a:noFill/>
-            <a:prstDash val="solid"/>
-            <a:miter/>
-          </a:ln>
-        </p:spPr>
-        <p:txBody>
-          <a:bodyPr rtlCol="0" anchor="ctr"/>
-          <a:lstStyle/>
-          <a:p>
-            <a:endParaRPr lang="en-US"/>
-          </a:p>
-        </p:txBody>
-      </p:sp>
-      <p:cxnSp>
-        <p:nvCxnSpPr>
-          <p:cNvPr id="15" name="Straight Connector 14">
-            <a:extLst>
-              <a:ext uri="{FF2B5EF4-FFF2-40B4-BE49-F238E27FC236}">
-                <a16:creationId xmlns:a16="http://schemas.microsoft.com/office/drawing/2014/main" id="{56020367-4FD5-4596-8E10-C5F095CD8DBF}"/>
-              </a:ext>
-              <a:ext uri="{C183D7F6-B498-43B3-948B-1728B52AA6E4}">
-                <adec:decorative xmlns:adec="http://schemas.microsoft.com/office/drawing/2017/decorative" val="1"/>
-              </a:ext>
-            </a:extLst>
-          </p:cNvPr>
-          <p:cNvCxnSpPr>
-            <a:cxnSpLocks noGrp="1" noRot="1" noChangeAspect="1" noMove="1" noResize="1" noEditPoints="1" noAdjustHandles="1" noChangeArrowheads="1" noChangeShapeType="1"/>
-          </p:cNvCxnSpPr>
-          <p:nvPr>
-            <p:extLst>
-              <p:ext uri="{386F3935-93C4-4BCD-93E2-E3B085C9AB24}">
-                <p16:designElem xmlns:p16="http://schemas.microsoft.com/office/powerpoint/2015/main" val="1"/>
-              </p:ext>
-            </p:extLst>
-          </p:nvPr>
-        </p:nvCxnSpPr>
-        <p:spPr>
-          <a:xfrm flipH="1">
-            <a:off x="838200" y="6274341"/>
-            <a:ext cx="11353800" cy="0"/>
+            <a:off x="5447322" y="1589368"/>
+            <a:ext cx="0" cy="5259754"/>
           </a:xfrm>
           <a:prstGeom prst="line">
             <a:avLst/>
@@ -4456,10 +4182,10 @@
       </p:cxnSp>
       <p:pic>
         <p:nvPicPr>
-          <p:cNvPr id="6" name="Picture 5" descr="A person wearing glasses and smiling at the camera&#10;&#10;Description automatically generated">
-            <a:extLst>
-              <a:ext uri="{FF2B5EF4-FFF2-40B4-BE49-F238E27FC236}">
-                <a16:creationId xmlns:a16="http://schemas.microsoft.com/office/drawing/2014/main" id="{A29270A5-97D2-4506-9DD0-AE6929417CE1}"/>
+          <p:cNvPr id="5" name="Picture 4" descr="A person wearing glasses and a blue shirt&#10;&#10;Description automatically generated">
+            <a:extLst>
+              <a:ext uri="{FF2B5EF4-FFF2-40B4-BE49-F238E27FC236}">
+                <a16:creationId xmlns:a16="http://schemas.microsoft.com/office/drawing/2014/main" id="{5885AE78-D5CC-44FB-BA54-A5F7E06C3CC6}"/>
               </a:ext>
             </a:extLst>
           </p:cNvPr>
@@ -4468,28 +4194,91 @@
           </p:cNvPicPr>
           <p:nvPr/>
         </p:nvPicPr>
-        <p:blipFill>
-          <a:blip r:embed="rId3">
+        <p:blipFill rotWithShape="1">
+          <a:blip r:embed="rId2">
             <a:extLst>
               <a:ext uri="{28A0092B-C50C-407E-A947-70E740481C1C}">
                 <a14:useLocalDpi xmlns:a14="http://schemas.microsoft.com/office/drawing/2010/main" val="0"/>
               </a:ext>
             </a:extLst>
           </a:blip>
-          <a:stretch>
-            <a:fillRect/>
-          </a:stretch>
+          <a:srcRect t="1181" r="-1" b="12024"/>
+          <a:stretch/>
         </p:blipFill>
         <p:spPr>
           <a:xfrm>
-            <a:off x="5457025" y="3608834"/>
-            <a:ext cx="1956497" cy="2608662"/>
+            <a:off x="5986926" y="1598246"/>
+            <a:ext cx="2574429" cy="2234452"/>
           </a:xfrm>
           <a:prstGeom prst="rect">
             <a:avLst/>
           </a:prstGeom>
         </p:spPr>
       </p:pic>
+      <p:pic>
+        <p:nvPicPr>
+          <p:cNvPr id="6" name="Picture 5" descr="A person wearing glasses and smiling at the camera&#10;&#10;Description automatically generated">
+            <a:extLst>
+              <a:ext uri="{FF2B5EF4-FFF2-40B4-BE49-F238E27FC236}">
+                <a16:creationId xmlns:a16="http://schemas.microsoft.com/office/drawing/2014/main" id="{A29270A5-97D2-4506-9DD0-AE6929417CE1}"/>
+              </a:ext>
+            </a:extLst>
+          </p:cNvPr>
+          <p:cNvPicPr>
+            <a:picLocks noChangeAspect="1"/>
+          </p:cNvPicPr>
+          <p:nvPr/>
+        </p:nvPicPr>
+        <p:blipFill rotWithShape="1">
+          <a:blip r:embed="rId3">
+            <a:extLst>
+              <a:ext uri="{28A0092B-C50C-407E-A947-70E740481C1C}">
+                <a14:useLocalDpi xmlns:a14="http://schemas.microsoft.com/office/drawing/2010/main" val="0"/>
+              </a:ext>
+            </a:extLst>
+          </a:blip>
+          <a:srcRect t="13189" r="-5" b="17185"/>
+          <a:stretch/>
+        </p:blipFill>
+        <p:spPr>
+          <a:xfrm>
+            <a:off x="8937172" y="1589368"/>
+            <a:ext cx="2416612" cy="2243330"/>
+          </a:xfrm>
+          <a:prstGeom prst="rect">
+            <a:avLst/>
+          </a:prstGeom>
+        </p:spPr>
+      </p:pic>
+      <p:pic>
+        <p:nvPicPr>
+          <p:cNvPr id="4" name="Picture 3">
+            <a:extLst>
+              <a:ext uri="{FF2B5EF4-FFF2-40B4-BE49-F238E27FC236}">
+                <a16:creationId xmlns:a16="http://schemas.microsoft.com/office/drawing/2014/main" id="{23CF2BEF-42E6-4433-B416-5BC61D2968AB}"/>
+              </a:ext>
+            </a:extLst>
+          </p:cNvPr>
+          <p:cNvPicPr>
+            <a:picLocks noChangeAspect="1"/>
+          </p:cNvPicPr>
+          <p:nvPr/>
+        </p:nvPicPr>
+        <p:blipFill rotWithShape="1">
+          <a:blip r:embed="rId4"/>
+          <a:srcRect t="24927" r="-1" b="13526"/>
+          <a:stretch/>
+        </p:blipFill>
+        <p:spPr>
+          <a:xfrm>
+            <a:off x="5986926" y="4126172"/>
+            <a:ext cx="5366858" cy="940350"/>
+          </a:xfrm>
+          <a:prstGeom prst="rect">
+            <a:avLst/>
+          </a:prstGeom>
+        </p:spPr>
+      </p:pic>
       <p:sp>
         <p:nvSpPr>
           <p:cNvPr id="7" name="TextBox 6">
@@ -4504,8 +4293,8 @@
         </p:nvSpPr>
         <p:spPr>
           <a:xfrm>
-            <a:off x="7561274" y="4180372"/>
-            <a:ext cx="4482973" cy="923330"/>
+            <a:off x="9026180" y="4174794"/>
+            <a:ext cx="4482973" cy="1077218"/>
           </a:xfrm>
           <a:prstGeom prst="rect">
             <a:avLst/>
@@ -4518,18 +4307,33 @@
           </a:bodyPr>
           <a:lstStyle/>
           <a:p>
+            <a:pPr>
+              <a:spcAft>
+                <a:spcPts val="600"/>
+              </a:spcAft>
+            </a:pPr>
             <a:r>
               <a:rPr lang="en-CA" dirty="0"/>
               <a:t>Name: Cody Edwards</a:t>
             </a:r>
           </a:p>
           <a:p>
+            <a:pPr>
+              <a:spcAft>
+                <a:spcPts val="600"/>
+              </a:spcAft>
+            </a:pPr>
             <a:r>
               <a:rPr lang="en-CA" dirty="0"/>
               <a:t>Student ID# 101216940</a:t>
             </a:r>
           </a:p>
           <a:p>
+            <a:pPr>
+              <a:spcAft>
+                <a:spcPts val="600"/>
+              </a:spcAft>
+            </a:pPr>
             <a:endParaRPr lang="en-CA" dirty="0"/>
           </a:p>
         </p:txBody>
@@ -4548,8 +4352,8 @@
         </p:nvSpPr>
         <p:spPr>
           <a:xfrm>
-            <a:off x="5457025" y="-1"/>
-            <a:ext cx="4314348" cy="646331"/>
+            <a:off x="6025026" y="4174794"/>
+            <a:ext cx="4314348" cy="723275"/>
           </a:xfrm>
           <a:prstGeom prst="rect">
             <a:avLst/>
@@ -4562,56 +4366,25 @@
           </a:bodyPr>
           <a:lstStyle/>
           <a:p>
+            <a:pPr>
+              <a:spcAft>
+                <a:spcPts val="600"/>
+              </a:spcAft>
+            </a:pPr>
             <a:r>
               <a:rPr lang="en-CA" dirty="0"/>
               <a:t>Name: Shila Rani Das</a:t>
             </a:r>
           </a:p>
           <a:p>
+            <a:pPr>
+              <a:spcAft>
+                <a:spcPts val="600"/>
+              </a:spcAft>
+            </a:pPr>
             <a:r>
               <a:rPr lang="en-CA" dirty="0"/>
               <a:t>Student ID# 101141958</a:t>
-            </a:r>
-          </a:p>
-        </p:txBody>
-      </p:sp>
-      <p:sp>
-        <p:nvSpPr>
-          <p:cNvPr id="12" name="TextBox 11">
-            <a:extLst>
-              <a:ext uri="{FF2B5EF4-FFF2-40B4-BE49-F238E27FC236}">
-                <a16:creationId xmlns:a16="http://schemas.microsoft.com/office/drawing/2014/main" id="{BF79881C-8EAE-4241-940E-F5275C8EFE3D}"/>
-              </a:ext>
-            </a:extLst>
-          </p:cNvPr>
-          <p:cNvSpPr txBox="1"/>
-          <p:nvPr/>
-        </p:nvSpPr>
-        <p:spPr>
-          <a:xfrm>
-            <a:off x="327171" y="427838"/>
-            <a:ext cx="4739779" cy="1138773"/>
-          </a:xfrm>
-          <a:prstGeom prst="rect">
-            <a:avLst/>
-          </a:prstGeom>
-          <a:noFill/>
-        </p:spPr>
-        <p:txBody>
-          <a:bodyPr wrap="square" rtlCol="0">
-            <a:spAutoFit/>
-          </a:bodyPr>
-          <a:lstStyle/>
-          <a:p>
-            <a:r>
-              <a:rPr lang="en-CA" sz="4400" dirty="0"/>
-              <a:t>Assignment 1:</a:t>
-            </a:r>
-          </a:p>
-          <a:p>
-            <a:r>
-              <a:rPr lang="en-CA" sz="2400" dirty="0"/>
-              <a:t>Motion in One and Two Directions</a:t>
             </a:r>
           </a:p>
         </p:txBody>

</xml_diff>